<commit_message>
Präsi + Funk-Hierarchie angepasst
</commit_message>
<xml_diff>
--- a/Funktions_hierachiebaum.pptx
+++ b/Funktions_hierachiebaum.pptx
@@ -121,345 +121,6 @@
 </p1510:revInfo>
 </file>
 
-<file path=ppt/changesInfos/changesInfo1.xml><?xml version="1.0" encoding="utf-8"?>
-<pc:chgInfo xmlns:a="http://schemas.openxmlformats.org/drawingml/2006/main" xmlns:r="http://schemas.openxmlformats.org/officeDocument/2006/relationships" xmlns:ac="http://schemas.microsoft.com/office/drawing/2013/main/command" xmlns:pc="http://schemas.microsoft.com/office/powerpoint/2013/main/command">
-  <pc:docChgLst>
-    <pc:chgData name="Denis Silva Meira" userId="5dbdbdf7580740ff" providerId="LiveId" clId="{0FA4E63B-62B8-4FB4-8FDC-98F071D47D52}"/>
-    <pc:docChg chg="custSel delSld modSld">
-      <pc:chgData name="Denis Silva Meira" userId="5dbdbdf7580740ff" providerId="LiveId" clId="{0FA4E63B-62B8-4FB4-8FDC-98F071D47D52}" dt="2025-12-13T09:51:00.054" v="607" actId="14100"/>
-      <pc:docMkLst>
-        <pc:docMk/>
-      </pc:docMkLst>
-      <pc:sldChg chg="del">
-        <pc:chgData name="Denis Silva Meira" userId="5dbdbdf7580740ff" providerId="LiveId" clId="{0FA4E63B-62B8-4FB4-8FDC-98F071D47D52}" dt="2025-12-12T12:53:24.004" v="0" actId="2696"/>
-        <pc:sldMkLst>
-          <pc:docMk/>
-          <pc:sldMk cId="1992920479" sldId="256"/>
-        </pc:sldMkLst>
-      </pc:sldChg>
-      <pc:sldChg chg="modSp mod">
-        <pc:chgData name="Denis Silva Meira" userId="5dbdbdf7580740ff" providerId="LiveId" clId="{0FA4E63B-62B8-4FB4-8FDC-98F071D47D52}" dt="2025-12-13T09:49:47.865" v="592" actId="20577"/>
-        <pc:sldMkLst>
-          <pc:docMk/>
-          <pc:sldMk cId="849298903" sldId="257"/>
-        </pc:sldMkLst>
-        <pc:spChg chg="mod">
-          <ac:chgData name="Denis Silva Meira" userId="5dbdbdf7580740ff" providerId="LiveId" clId="{0FA4E63B-62B8-4FB4-8FDC-98F071D47D52}" dt="2025-12-13T09:49:47.865" v="592" actId="20577"/>
-          <ac:spMkLst>
-            <pc:docMk/>
-            <pc:sldMk cId="849298903" sldId="257"/>
-            <ac:spMk id="3" creationId="{C66BBB5F-A274-BF08-7DA4-755C20EFFD6E}"/>
-          </ac:spMkLst>
-        </pc:spChg>
-      </pc:sldChg>
-      <pc:sldChg chg="addSp delSp modSp mod">
-        <pc:chgData name="Denis Silva Meira" userId="5dbdbdf7580740ff" providerId="LiveId" clId="{0FA4E63B-62B8-4FB4-8FDC-98F071D47D52}" dt="2025-12-13T09:51:00.054" v="607" actId="14100"/>
-        <pc:sldMkLst>
-          <pc:docMk/>
-          <pc:sldMk cId="3730357880" sldId="258"/>
-        </pc:sldMkLst>
-        <pc:spChg chg="mod">
-          <ac:chgData name="Denis Silva Meira" userId="5dbdbdf7580740ff" providerId="LiveId" clId="{0FA4E63B-62B8-4FB4-8FDC-98F071D47D52}" dt="2025-12-13T09:46:48.468" v="370" actId="1076"/>
-          <ac:spMkLst>
-            <pc:docMk/>
-            <pc:sldMk cId="3730357880" sldId="258"/>
-            <ac:spMk id="5" creationId="{3187FA81-B37F-3F5D-5155-0660C5925B44}"/>
-          </ac:spMkLst>
-        </pc:spChg>
-        <pc:spChg chg="mod">
-          <ac:chgData name="Denis Silva Meira" userId="5dbdbdf7580740ff" providerId="LiveId" clId="{0FA4E63B-62B8-4FB4-8FDC-98F071D47D52}" dt="2025-12-13T09:46:48.468" v="370" actId="1076"/>
-          <ac:spMkLst>
-            <pc:docMk/>
-            <pc:sldMk cId="3730357880" sldId="258"/>
-            <ac:spMk id="6" creationId="{6CC2D986-4237-AE24-7BDB-491B78BD3581}"/>
-          </ac:spMkLst>
-        </pc:spChg>
-        <pc:spChg chg="del">
-          <ac:chgData name="Denis Silva Meira" userId="5dbdbdf7580740ff" providerId="LiveId" clId="{0FA4E63B-62B8-4FB4-8FDC-98F071D47D52}" dt="2025-12-13T09:36:37.144" v="12" actId="478"/>
-          <ac:spMkLst>
-            <pc:docMk/>
-            <pc:sldMk cId="3730357880" sldId="258"/>
-            <ac:spMk id="7" creationId="{478B44F2-4945-D035-D888-4C8599F1EE78}"/>
-          </ac:spMkLst>
-        </pc:spChg>
-        <pc:spChg chg="mod">
-          <ac:chgData name="Denis Silva Meira" userId="5dbdbdf7580740ff" providerId="LiveId" clId="{0FA4E63B-62B8-4FB4-8FDC-98F071D47D52}" dt="2025-12-13T09:46:48.468" v="370" actId="1076"/>
-          <ac:spMkLst>
-            <pc:docMk/>
-            <pc:sldMk cId="3730357880" sldId="258"/>
-            <ac:spMk id="8" creationId="{4F43B78F-0BA6-E822-5C21-10228E27E364}"/>
-          </ac:spMkLst>
-        </pc:spChg>
-        <pc:spChg chg="mod">
-          <ac:chgData name="Denis Silva Meira" userId="5dbdbdf7580740ff" providerId="LiveId" clId="{0FA4E63B-62B8-4FB4-8FDC-98F071D47D52}" dt="2025-12-13T09:46:48.468" v="370" actId="1076"/>
-          <ac:spMkLst>
-            <pc:docMk/>
-            <pc:sldMk cId="3730357880" sldId="258"/>
-            <ac:spMk id="9" creationId="{FD0A28A6-D262-4C8F-5881-DAFC3091664E}"/>
-          </ac:spMkLst>
-        </pc:spChg>
-        <pc:spChg chg="del mod">
-          <ac:chgData name="Denis Silva Meira" userId="5dbdbdf7580740ff" providerId="LiveId" clId="{0FA4E63B-62B8-4FB4-8FDC-98F071D47D52}" dt="2025-12-13T09:37:35.084" v="19" actId="478"/>
-          <ac:spMkLst>
-            <pc:docMk/>
-            <pc:sldMk cId="3730357880" sldId="258"/>
-            <ac:spMk id="10" creationId="{B7D74853-8452-9574-67CA-1642DFBCE7DE}"/>
-          </ac:spMkLst>
-        </pc:spChg>
-        <pc:spChg chg="del">
-          <ac:chgData name="Denis Silva Meira" userId="5dbdbdf7580740ff" providerId="LiveId" clId="{0FA4E63B-62B8-4FB4-8FDC-98F071D47D52}" dt="2025-12-13T09:37:36.960" v="22" actId="478"/>
-          <ac:spMkLst>
-            <pc:docMk/>
-            <pc:sldMk cId="3730357880" sldId="258"/>
-            <ac:spMk id="11" creationId="{1C542889-76ED-D8F6-6988-857A1B671195}"/>
-          </ac:spMkLst>
-        </pc:spChg>
-        <pc:spChg chg="del">
-          <ac:chgData name="Denis Silva Meira" userId="5dbdbdf7580740ff" providerId="LiveId" clId="{0FA4E63B-62B8-4FB4-8FDC-98F071D47D52}" dt="2025-12-13T09:37:36.452" v="21" actId="478"/>
-          <ac:spMkLst>
-            <pc:docMk/>
-            <pc:sldMk cId="3730357880" sldId="258"/>
-            <ac:spMk id="12" creationId="{FCC47784-33F9-5813-A189-0FA40682E8D0}"/>
-          </ac:spMkLst>
-        </pc:spChg>
-        <pc:spChg chg="del">
-          <ac:chgData name="Denis Silva Meira" userId="5dbdbdf7580740ff" providerId="LiveId" clId="{0FA4E63B-62B8-4FB4-8FDC-98F071D47D52}" dt="2025-12-13T09:37:35.862" v="20" actId="478"/>
-          <ac:spMkLst>
-            <pc:docMk/>
-            <pc:sldMk cId="3730357880" sldId="258"/>
-            <ac:spMk id="13" creationId="{992DA73C-5320-A31A-BA80-0D8259CC57BD}"/>
-          </ac:spMkLst>
-        </pc:spChg>
-        <pc:spChg chg="del">
-          <ac:chgData name="Denis Silva Meira" userId="5dbdbdf7580740ff" providerId="LiveId" clId="{0FA4E63B-62B8-4FB4-8FDC-98F071D47D52}" dt="2025-12-13T09:43:03.320" v="129" actId="478"/>
-          <ac:spMkLst>
-            <pc:docMk/>
-            <pc:sldMk cId="3730357880" sldId="258"/>
-            <ac:spMk id="16" creationId="{EACBE9B6-28B2-B702-7254-C498C5708EFB}"/>
-          </ac:spMkLst>
-        </pc:spChg>
-        <pc:spChg chg="del">
-          <ac:chgData name="Denis Silva Meira" userId="5dbdbdf7580740ff" providerId="LiveId" clId="{0FA4E63B-62B8-4FB4-8FDC-98F071D47D52}" dt="2025-12-13T09:43:04.051" v="130" actId="478"/>
-          <ac:spMkLst>
-            <pc:docMk/>
-            <pc:sldMk cId="3730357880" sldId="258"/>
-            <ac:spMk id="17" creationId="{2FFE64DB-D5A3-E666-F9B8-5AA61859447E}"/>
-          </ac:spMkLst>
-        </pc:spChg>
-        <pc:spChg chg="add del">
-          <ac:chgData name="Denis Silva Meira" userId="5dbdbdf7580740ff" providerId="LiveId" clId="{0FA4E63B-62B8-4FB4-8FDC-98F071D47D52}" dt="2025-12-13T09:38:04.427" v="35" actId="478"/>
-          <ac:spMkLst>
-            <pc:docMk/>
-            <pc:sldMk cId="3730357880" sldId="258"/>
-            <ac:spMk id="52" creationId="{5BDEF368-9A33-16CC-14B1-7419BDF332B1}"/>
-          </ac:spMkLst>
-        </pc:spChg>
-        <pc:spChg chg="add del mod">
-          <ac:chgData name="Denis Silva Meira" userId="5dbdbdf7580740ff" providerId="LiveId" clId="{0FA4E63B-62B8-4FB4-8FDC-98F071D47D52}" dt="2025-12-13T09:40:19.777" v="74" actId="478"/>
-          <ac:spMkLst>
-            <pc:docMk/>
-            <pc:sldMk cId="3730357880" sldId="258"/>
-            <ac:spMk id="53" creationId="{E0BB7F21-58DE-E6A7-42DA-4523787715C1}"/>
-          </ac:spMkLst>
-        </pc:spChg>
-        <pc:spChg chg="add mod">
-          <ac:chgData name="Denis Silva Meira" userId="5dbdbdf7580740ff" providerId="LiveId" clId="{0FA4E63B-62B8-4FB4-8FDC-98F071D47D52}" dt="2025-12-13T09:46:48.468" v="370" actId="1076"/>
-          <ac:spMkLst>
-            <pc:docMk/>
-            <pc:sldMk cId="3730357880" sldId="258"/>
-            <ac:spMk id="54" creationId="{8B06F666-FB77-355E-84B8-DCDF71B493D0}"/>
-          </ac:spMkLst>
-        </pc:spChg>
-        <pc:spChg chg="add mod">
-          <ac:chgData name="Denis Silva Meira" userId="5dbdbdf7580740ff" providerId="LiveId" clId="{0FA4E63B-62B8-4FB4-8FDC-98F071D47D52}" dt="2025-12-13T09:50:46.472" v="603" actId="1076"/>
-          <ac:spMkLst>
-            <pc:docMk/>
-            <pc:sldMk cId="3730357880" sldId="258"/>
-            <ac:spMk id="55" creationId="{105A720B-F707-67FE-A939-4BB62E663157}"/>
-          </ac:spMkLst>
-        </pc:spChg>
-        <pc:spChg chg="add mod">
-          <ac:chgData name="Denis Silva Meira" userId="5dbdbdf7580740ff" providerId="LiveId" clId="{0FA4E63B-62B8-4FB4-8FDC-98F071D47D52}" dt="2025-12-13T09:46:48.468" v="370" actId="1076"/>
-          <ac:spMkLst>
-            <pc:docMk/>
-            <pc:sldMk cId="3730357880" sldId="258"/>
-            <ac:spMk id="56" creationId="{143543F4-519A-A901-DF98-214AB5654AEB}"/>
-          </ac:spMkLst>
-        </pc:spChg>
-        <pc:spChg chg="add del mod">
-          <ac:chgData name="Denis Silva Meira" userId="5dbdbdf7580740ff" providerId="LiveId" clId="{0FA4E63B-62B8-4FB4-8FDC-98F071D47D52}" dt="2025-12-13T09:40:18.898" v="73" actId="478"/>
-          <ac:spMkLst>
-            <pc:docMk/>
-            <pc:sldMk cId="3730357880" sldId="258"/>
-            <ac:spMk id="57" creationId="{A5C5D591-3D20-6CE5-C580-1C8DD25A82D7}"/>
-          </ac:spMkLst>
-        </pc:spChg>
-        <pc:spChg chg="add mod">
-          <ac:chgData name="Denis Silva Meira" userId="5dbdbdf7580740ff" providerId="LiveId" clId="{0FA4E63B-62B8-4FB4-8FDC-98F071D47D52}" dt="2025-12-13T09:46:48.468" v="370" actId="1076"/>
-          <ac:spMkLst>
-            <pc:docMk/>
-            <pc:sldMk cId="3730357880" sldId="258"/>
-            <ac:spMk id="64" creationId="{96B46517-77E7-E0F0-5CCF-15282440B72D}"/>
-          </ac:spMkLst>
-        </pc:spChg>
-        <pc:spChg chg="add mod">
-          <ac:chgData name="Denis Silva Meira" userId="5dbdbdf7580740ff" providerId="LiveId" clId="{0FA4E63B-62B8-4FB4-8FDC-98F071D47D52}" dt="2025-12-13T09:47:16.582" v="428" actId="20577"/>
-          <ac:spMkLst>
-            <pc:docMk/>
-            <pc:sldMk cId="3730357880" sldId="258"/>
-            <ac:spMk id="95" creationId="{805362AF-4828-1871-1AD4-A977F63441DF}"/>
-          </ac:spMkLst>
-        </pc:spChg>
-        <pc:cxnChg chg="mod">
-          <ac:chgData name="Denis Silva Meira" userId="5dbdbdf7580740ff" providerId="LiveId" clId="{0FA4E63B-62B8-4FB4-8FDC-98F071D47D52}" dt="2025-12-13T09:42:52.838" v="126" actId="1076"/>
-          <ac:cxnSpMkLst>
-            <pc:docMk/>
-            <pc:sldMk cId="3730357880" sldId="258"/>
-            <ac:cxnSpMk id="19" creationId="{0816CE1E-98BA-F0F1-DBD5-E5524B81988F}"/>
-          </ac:cxnSpMkLst>
-        </pc:cxnChg>
-        <pc:cxnChg chg="del mod">
-          <ac:chgData name="Denis Silva Meira" userId="5dbdbdf7580740ff" providerId="LiveId" clId="{0FA4E63B-62B8-4FB4-8FDC-98F071D47D52}" dt="2025-12-13T09:36:38.110" v="13" actId="478"/>
-          <ac:cxnSpMkLst>
-            <pc:docMk/>
-            <pc:sldMk cId="3730357880" sldId="258"/>
-            <ac:cxnSpMk id="21" creationId="{1F0261C4-0875-156B-5694-A1581F2C374A}"/>
-          </ac:cxnSpMkLst>
-        </pc:cxnChg>
-        <pc:cxnChg chg="del mod">
-          <ac:chgData name="Denis Silva Meira" userId="5dbdbdf7580740ff" providerId="LiveId" clId="{0FA4E63B-62B8-4FB4-8FDC-98F071D47D52}" dt="2025-12-13T09:37:40.099" v="28" actId="478"/>
-          <ac:cxnSpMkLst>
-            <pc:docMk/>
-            <pc:sldMk cId="3730357880" sldId="258"/>
-            <ac:cxnSpMk id="23" creationId="{F1EBCF9F-A1E1-6EBF-A289-575A375E0A81}"/>
-          </ac:cxnSpMkLst>
-        </pc:cxnChg>
-        <pc:cxnChg chg="del mod">
-          <ac:chgData name="Denis Silva Meira" userId="5dbdbdf7580740ff" providerId="LiveId" clId="{0FA4E63B-62B8-4FB4-8FDC-98F071D47D52}" dt="2025-12-13T09:37:39.449" v="27" actId="478"/>
-          <ac:cxnSpMkLst>
-            <pc:docMk/>
-            <pc:sldMk cId="3730357880" sldId="258"/>
-            <ac:cxnSpMk id="25" creationId="{62C9C595-F7C1-AA72-E0C1-0C8E6D4F4DE7}"/>
-          </ac:cxnSpMkLst>
-        </pc:cxnChg>
-        <pc:cxnChg chg="del mod">
-          <ac:chgData name="Denis Silva Meira" userId="5dbdbdf7580740ff" providerId="LiveId" clId="{0FA4E63B-62B8-4FB4-8FDC-98F071D47D52}" dt="2025-12-13T09:37:38.810" v="26" actId="478"/>
-          <ac:cxnSpMkLst>
-            <pc:docMk/>
-            <pc:sldMk cId="3730357880" sldId="258"/>
-            <ac:cxnSpMk id="27" creationId="{20DFC370-8F9A-0285-4752-45B60AF65DA8}"/>
-          </ac:cxnSpMkLst>
-        </pc:cxnChg>
-        <pc:cxnChg chg="del mod">
-          <ac:chgData name="Denis Silva Meira" userId="5dbdbdf7580740ff" providerId="LiveId" clId="{0FA4E63B-62B8-4FB4-8FDC-98F071D47D52}" dt="2025-12-13T09:37:38.252" v="25" actId="478"/>
-          <ac:cxnSpMkLst>
-            <pc:docMk/>
-            <pc:sldMk cId="3730357880" sldId="258"/>
-            <ac:cxnSpMk id="29" creationId="{828BCDB1-243A-FA7C-37B4-05CCA7B33A94}"/>
-          </ac:cxnSpMkLst>
-        </pc:cxnChg>
-        <pc:cxnChg chg="del mod">
-          <ac:chgData name="Denis Silva Meira" userId="5dbdbdf7580740ff" providerId="LiveId" clId="{0FA4E63B-62B8-4FB4-8FDC-98F071D47D52}" dt="2025-12-13T09:37:37.500" v="23" actId="478"/>
-          <ac:cxnSpMkLst>
-            <pc:docMk/>
-            <pc:sldMk cId="3730357880" sldId="258"/>
-            <ac:cxnSpMk id="31" creationId="{64EDB3EA-C7EB-77DA-619C-CCD73B2B1B0B}"/>
-          </ac:cxnSpMkLst>
-        </pc:cxnChg>
-        <pc:cxnChg chg="mod">
-          <ac:chgData name="Denis Silva Meira" userId="5dbdbdf7580740ff" providerId="LiveId" clId="{0FA4E63B-62B8-4FB4-8FDC-98F071D47D52}" dt="2025-12-13T09:46:48.468" v="370" actId="1076"/>
-          <ac:cxnSpMkLst>
-            <pc:docMk/>
-            <pc:sldMk cId="3730357880" sldId="258"/>
-            <ac:cxnSpMk id="33" creationId="{298BBBC7-2396-30EF-C1D0-CE7B813B3E2A}"/>
-          </ac:cxnSpMkLst>
-        </pc:cxnChg>
-        <pc:cxnChg chg="mod">
-          <ac:chgData name="Denis Silva Meira" userId="5dbdbdf7580740ff" providerId="LiveId" clId="{0FA4E63B-62B8-4FB4-8FDC-98F071D47D52}" dt="2025-12-13T09:42:38.965" v="121" actId="14100"/>
-          <ac:cxnSpMkLst>
-            <pc:docMk/>
-            <pc:sldMk cId="3730357880" sldId="258"/>
-            <ac:cxnSpMk id="35" creationId="{EC77B619-FD95-078C-FDD8-CBE192157AE2}"/>
-          </ac:cxnSpMkLst>
-        </pc:cxnChg>
-        <pc:cxnChg chg="del mod">
-          <ac:chgData name="Denis Silva Meira" userId="5dbdbdf7580740ff" providerId="LiveId" clId="{0FA4E63B-62B8-4FB4-8FDC-98F071D47D52}" dt="2025-12-13T09:36:39.929" v="14" actId="478"/>
-          <ac:cxnSpMkLst>
-            <pc:docMk/>
-            <pc:sldMk cId="3730357880" sldId="258"/>
-            <ac:cxnSpMk id="37" creationId="{8949679E-340D-52BB-D95C-FE263EC5CB83}"/>
-          </ac:cxnSpMkLst>
-        </pc:cxnChg>
-        <pc:cxnChg chg="del mod">
-          <ac:chgData name="Denis Silva Meira" userId="5dbdbdf7580740ff" providerId="LiveId" clId="{0FA4E63B-62B8-4FB4-8FDC-98F071D47D52}" dt="2025-12-13T09:37:41.249" v="29" actId="478"/>
-          <ac:cxnSpMkLst>
-            <pc:docMk/>
-            <pc:sldMk cId="3730357880" sldId="258"/>
-            <ac:cxnSpMk id="39" creationId="{3DDF7639-B6E6-0D7F-9239-FDE4A3644298}"/>
-          </ac:cxnSpMkLst>
-        </pc:cxnChg>
-        <pc:cxnChg chg="del mod">
-          <ac:chgData name="Denis Silva Meira" userId="5dbdbdf7580740ff" providerId="LiveId" clId="{0FA4E63B-62B8-4FB4-8FDC-98F071D47D52}" dt="2025-12-13T09:37:42.171" v="30" actId="478"/>
-          <ac:cxnSpMkLst>
-            <pc:docMk/>
-            <pc:sldMk cId="3730357880" sldId="258"/>
-            <ac:cxnSpMk id="41" creationId="{D8C39F93-4482-8454-9247-7D0D1B3375F3}"/>
-          </ac:cxnSpMkLst>
-        </pc:cxnChg>
-        <pc:cxnChg chg="del mod">
-          <ac:chgData name="Denis Silva Meira" userId="5dbdbdf7580740ff" providerId="LiveId" clId="{0FA4E63B-62B8-4FB4-8FDC-98F071D47D52}" dt="2025-12-13T09:37:42.983" v="31" actId="478"/>
-          <ac:cxnSpMkLst>
-            <pc:docMk/>
-            <pc:sldMk cId="3730357880" sldId="258"/>
-            <ac:cxnSpMk id="43" creationId="{E527B373-F278-12C5-E2C6-9CD07D6FA2F2}"/>
-          </ac:cxnSpMkLst>
-        </pc:cxnChg>
-        <pc:cxnChg chg="add mod">
-          <ac:chgData name="Denis Silva Meira" userId="5dbdbdf7580740ff" providerId="LiveId" clId="{0FA4E63B-62B8-4FB4-8FDC-98F071D47D52}" dt="2025-12-13T09:50:16.985" v="594" actId="14100"/>
-          <ac:cxnSpMkLst>
-            <pc:docMk/>
-            <pc:sldMk cId="3730357880" sldId="258"/>
-            <ac:cxnSpMk id="73" creationId="{E16C0238-CE1E-DC5C-D55F-261F84A8721C}"/>
-          </ac:cxnSpMkLst>
-        </pc:cxnChg>
-        <pc:cxnChg chg="add mod">
-          <ac:chgData name="Denis Silva Meira" userId="5dbdbdf7580740ff" providerId="LiveId" clId="{0FA4E63B-62B8-4FB4-8FDC-98F071D47D52}" dt="2025-12-13T09:50:55.641" v="606" actId="14100"/>
-          <ac:cxnSpMkLst>
-            <pc:docMk/>
-            <pc:sldMk cId="3730357880" sldId="258"/>
-            <ac:cxnSpMk id="77" creationId="{5EC2CF19-3ADA-0298-65D2-9FD3732040F0}"/>
-          </ac:cxnSpMkLst>
-        </pc:cxnChg>
-        <pc:cxnChg chg="add mod">
-          <ac:chgData name="Denis Silva Meira" userId="5dbdbdf7580740ff" providerId="LiveId" clId="{0FA4E63B-62B8-4FB4-8FDC-98F071D47D52}" dt="2025-12-13T09:51:00.054" v="607" actId="14100"/>
-          <ac:cxnSpMkLst>
-            <pc:docMk/>
-            <pc:sldMk cId="3730357880" sldId="258"/>
-            <ac:cxnSpMk id="80" creationId="{F0578AFD-88D6-523D-A1D8-4F2F61733503}"/>
-          </ac:cxnSpMkLst>
-        </pc:cxnChg>
-        <pc:cxnChg chg="add mod">
-          <ac:chgData name="Denis Silva Meira" userId="5dbdbdf7580740ff" providerId="LiveId" clId="{0FA4E63B-62B8-4FB4-8FDC-98F071D47D52}" dt="2025-12-13T09:42:58.561" v="128" actId="14100"/>
-          <ac:cxnSpMkLst>
-            <pc:docMk/>
-            <pc:sldMk cId="3730357880" sldId="258"/>
-            <ac:cxnSpMk id="87" creationId="{6B2E3567-8394-8C67-71F8-E27BEF5B5DCC}"/>
-          </ac:cxnSpMkLst>
-        </pc:cxnChg>
-        <pc:cxnChg chg="add mod">
-          <ac:chgData name="Denis Silva Meira" userId="5dbdbdf7580740ff" providerId="LiveId" clId="{0FA4E63B-62B8-4FB4-8FDC-98F071D47D52}" dt="2025-12-13T09:46:48.468" v="370" actId="1076"/>
-          <ac:cxnSpMkLst>
-            <pc:docMk/>
-            <pc:sldMk cId="3730357880" sldId="258"/>
-            <ac:cxnSpMk id="92" creationId="{58317EA6-07CF-56FF-0ED2-EC9DC1F8CBFB}"/>
-          </ac:cxnSpMkLst>
-        </pc:cxnChg>
-      </pc:sldChg>
-    </pc:docChg>
-  </pc:docChgLst>
-</pc:chgInfo>
-</file>
-
 <file path=ppt/slideLayouts/slideLayout1.xml><?xml version="1.0" encoding="utf-8"?>
 <p:sldLayout xmlns:a="http://schemas.openxmlformats.org/drawingml/2006/main" xmlns:r="http://schemas.openxmlformats.org/officeDocument/2006/relationships" xmlns:p="http://schemas.openxmlformats.org/presentationml/2006/main" type="title" preserve="1">
   <p:cSld name="Title Slide">
@@ -673,7 +334,7 @@
           <a:p>
             <a:fld id="{2D9265ED-3E02-4D33-BBF1-61BB7F933016}" type="slidenum">
               <a:rPr lang="de-CH" smtClean="0"/>
-              <a:t>‹#›</a:t>
+              <a:t>‹Nr.›</a:t>
             </a:fld>
             <a:endParaRPr lang="de-CH"/>
           </a:p>
@@ -988,7 +649,7 @@
           <a:p>
             <a:fld id="{2D9265ED-3E02-4D33-BBF1-61BB7F933016}" type="slidenum">
               <a:rPr lang="de-CH" smtClean="0"/>
-              <a:t>‹#›</a:t>
+              <a:t>‹Nr.›</a:t>
             </a:fld>
             <a:endParaRPr lang="de-CH"/>
           </a:p>
@@ -1210,7 +871,7 @@
           <a:p>
             <a:fld id="{2D9265ED-3E02-4D33-BBF1-61BB7F933016}" type="slidenum">
               <a:rPr lang="de-CH" smtClean="0"/>
-              <a:t>‹#›</a:t>
+              <a:t>‹Nr.›</a:t>
             </a:fld>
             <a:endParaRPr lang="de-CH"/>
           </a:p>
@@ -1501,7 +1162,7 @@
           <a:p>
             <a:fld id="{2D9265ED-3E02-4D33-BBF1-61BB7F933016}" type="slidenum">
               <a:rPr lang="de-CH" smtClean="0"/>
-              <a:t>‹#›</a:t>
+              <a:t>‹Nr.›</a:t>
             </a:fld>
             <a:endParaRPr lang="de-CH"/>
           </a:p>
@@ -1955,7 +1616,7 @@
           <a:p>
             <a:fld id="{2D9265ED-3E02-4D33-BBF1-61BB7F933016}" type="slidenum">
               <a:rPr lang="de-CH" smtClean="0"/>
-              <a:t>‹#›</a:t>
+              <a:t>‹Nr.›</a:t>
             </a:fld>
             <a:endParaRPr lang="de-CH"/>
           </a:p>
@@ -2531,7 +2192,7 @@
           <a:p>
             <a:fld id="{2D9265ED-3E02-4D33-BBF1-61BB7F933016}" type="slidenum">
               <a:rPr lang="de-CH" smtClean="0"/>
-              <a:t>‹#›</a:t>
+              <a:t>‹Nr.›</a:t>
             </a:fld>
             <a:endParaRPr lang="de-CH"/>
           </a:p>
@@ -3392,7 +3053,7 @@
           <a:p>
             <a:fld id="{2D9265ED-3E02-4D33-BBF1-61BB7F933016}" type="slidenum">
               <a:rPr lang="de-CH" smtClean="0"/>
-              <a:t>‹#›</a:t>
+              <a:t>‹Nr.›</a:t>
             </a:fld>
             <a:endParaRPr lang="de-CH"/>
           </a:p>
@@ -3597,7 +3258,7 @@
           <a:p>
             <a:fld id="{2D9265ED-3E02-4D33-BBF1-61BB7F933016}" type="slidenum">
               <a:rPr lang="de-CH" smtClean="0"/>
-              <a:t>‹#›</a:t>
+              <a:t>‹Nr.›</a:t>
             </a:fld>
             <a:endParaRPr lang="de-CH"/>
           </a:p>
@@ -3811,7 +3472,7 @@
           <a:p>
             <a:fld id="{2D9265ED-3E02-4D33-BBF1-61BB7F933016}" type="slidenum">
               <a:rPr lang="de-CH" smtClean="0"/>
-              <a:t>‹#›</a:t>
+              <a:t>‹Nr.›</a:t>
             </a:fld>
             <a:endParaRPr lang="de-CH"/>
           </a:p>
@@ -4011,7 +3672,7 @@
           <a:p>
             <a:fld id="{2D9265ED-3E02-4D33-BBF1-61BB7F933016}" type="slidenum">
               <a:rPr lang="de-CH" smtClean="0"/>
-              <a:t>‹#›</a:t>
+              <a:t>‹Nr.›</a:t>
             </a:fld>
             <a:endParaRPr lang="de-CH"/>
           </a:p>
@@ -4216,7 +3877,7 @@
           <a:p>
             <a:fld id="{2D9265ED-3E02-4D33-BBF1-61BB7F933016}" type="slidenum">
               <a:rPr lang="de-CH" smtClean="0"/>
-              <a:t>‹#›</a:t>
+              <a:t>‹Nr.›</a:t>
             </a:fld>
             <a:endParaRPr lang="de-CH"/>
           </a:p>
@@ -4496,7 +4157,7 @@
           <a:p>
             <a:fld id="{2D9265ED-3E02-4D33-BBF1-61BB7F933016}" type="slidenum">
               <a:rPr lang="de-CH" smtClean="0"/>
-              <a:t>‹#›</a:t>
+              <a:t>‹Nr.›</a:t>
             </a:fld>
             <a:endParaRPr lang="de-CH"/>
           </a:p>
@@ -4763,7 +4424,7 @@
           <a:p>
             <a:fld id="{2D9265ED-3E02-4D33-BBF1-61BB7F933016}" type="slidenum">
               <a:rPr lang="de-CH" smtClean="0"/>
-              <a:t>‹#›</a:t>
+              <a:t>‹Nr.›</a:t>
             </a:fld>
             <a:endParaRPr lang="de-CH"/>
           </a:p>
@@ -5178,7 +4839,7 @@
           <a:p>
             <a:fld id="{2D9265ED-3E02-4D33-BBF1-61BB7F933016}" type="slidenum">
               <a:rPr lang="de-CH" smtClean="0"/>
-              <a:t>‹#›</a:t>
+              <a:t>‹Nr.›</a:t>
             </a:fld>
             <a:endParaRPr lang="de-CH"/>
           </a:p>
@@ -5326,7 +4987,7 @@
           <a:p>
             <a:fld id="{2D9265ED-3E02-4D33-BBF1-61BB7F933016}" type="slidenum">
               <a:rPr lang="de-CH" smtClean="0"/>
-              <a:t>‹#›</a:t>
+              <a:t>‹Nr.›</a:t>
             </a:fld>
             <a:endParaRPr lang="de-CH"/>
           </a:p>
@@ -5451,7 +5112,7 @@
           <a:p>
             <a:fld id="{2D9265ED-3E02-4D33-BBF1-61BB7F933016}" type="slidenum">
               <a:rPr lang="de-CH" smtClean="0"/>
-              <a:t>‹#›</a:t>
+              <a:t>‹Nr.›</a:t>
             </a:fld>
             <a:endParaRPr lang="de-CH"/>
           </a:p>
@@ -5730,7 +5391,7 @@
           <a:p>
             <a:fld id="{2D9265ED-3E02-4D33-BBF1-61BB7F933016}" type="slidenum">
               <a:rPr lang="de-CH" smtClean="0"/>
-              <a:t>‹#›</a:t>
+              <a:t>‹Nr.›</a:t>
             </a:fld>
             <a:endParaRPr lang="de-CH"/>
           </a:p>
@@ -6045,7 +5706,7 @@
           <a:p>
             <a:fld id="{2D9265ED-3E02-4D33-BBF1-61BB7F933016}" type="slidenum">
               <a:rPr lang="de-CH" smtClean="0"/>
-              <a:t>‹#›</a:t>
+              <a:t>‹Nr.›</a:t>
             </a:fld>
             <a:endParaRPr lang="de-CH"/>
           </a:p>
@@ -6330,7 +5991,7 @@
           <a:p>
             <a:fld id="{2D9265ED-3E02-4D33-BBF1-61BB7F933016}" type="slidenum">
               <a:rPr lang="de-CH" smtClean="0"/>
-              <a:t>‹#›</a:t>
+              <a:t>‹Nr.›</a:t>
             </a:fld>
             <a:endParaRPr lang="de-CH"/>
           </a:p>
@@ -7500,7 +7161,7 @@
         </p:spPr>
         <p:txBody>
           <a:bodyPr>
-            <a:normAutofit fontScale="62500" lnSpcReduction="20000"/>
+            <a:normAutofit fontScale="47500" lnSpcReduction="20000"/>
           </a:bodyPr>
           <a:lstStyle/>
           <a:p>
@@ -7548,9 +7209,12 @@
           <a:p>
             <a:r>
               <a:rPr lang="de-CH" sz="1800" b="1" dirty="0" err="1"/>
-              <a:t>str,str,str,float,float,float,float,float,float</a:t>
-            </a:r>
-            <a:endParaRPr lang="de-CH" sz="1800" b="1" dirty="0"/>
+              <a:t>str,str,FLOAT,str,float,float,float,float,float</a:t>
+            </a:r>
+            <a:r>
+              <a:rPr lang="de-CH" sz="1800" b="1" dirty="0"/>
+              <a:t>,</a:t>
+            </a:r>
           </a:p>
           <a:p>
             <a:r>
@@ -7574,7 +7238,7 @@
             <a:pPr lvl="1"/>
             <a:r>
               <a:rPr lang="de-CH" sz="1800" dirty="0"/>
-              <a:t>Mustermann,Max,Montag,100,08.00,12.00,13.00,17.00, </a:t>
+              <a:t>Mustermann,Max,100,Montag,08.00,12.00,13.00,17.00, </a:t>
             </a:r>
             <a:r>
               <a:rPr lang="de-CH" dirty="0"/>
@@ -7586,7 +7250,7 @@
             <a:pPr lvl="1"/>
             <a:r>
               <a:rPr lang="de-CH" sz="1800" dirty="0"/>
-              <a:t>Musterfrau,Maxine,Dienstag,80,08.00,12.00,13.00,17.00</a:t>
+              <a:t>Musterfrau,Maxine,80,Dienstag,08.00,12.00,13.00,17.00</a:t>
             </a:r>
             <a:r>
               <a:rPr lang="de-CH" dirty="0"/>
@@ -7610,43 +7274,71 @@
           <a:p>
             <a:pPr lvl="1"/>
             <a:r>
-              <a:rPr lang="de-CH" sz="1800" dirty="0"/>
+              <a:rPr lang="de-CH" sz="1600" dirty="0"/>
+              <a:t>Warnung bei Wochenendarbeit!</a:t>
+            </a:r>
+          </a:p>
+          <a:p>
+            <a:pPr lvl="1"/>
+            <a:r>
+              <a:rPr lang="de-CH" sz="1600" dirty="0"/>
+              <a:t>Komplette eingelesene Datenstruktur</a:t>
+            </a:r>
+          </a:p>
+          <a:p>
+            <a:pPr lvl="1"/>
+            <a:r>
+              <a:rPr lang="de-CH" sz="1600" dirty="0"/>
+              <a:t>Übersicht</a:t>
+            </a:r>
+          </a:p>
+          <a:p>
+            <a:pPr lvl="2"/>
+            <a:r>
+              <a:rPr lang="de-CH" dirty="0"/>
               <a:t>Nachname, Vorname, Pensum</a:t>
             </a:r>
           </a:p>
           <a:p>
-            <a:pPr lvl="1"/>
-            <a:r>
-              <a:rPr lang="de-CH" sz="1800" dirty="0"/>
+            <a:pPr lvl="2"/>
+            <a:r>
+              <a:rPr lang="de-CH" dirty="0"/>
               <a:t>Effektivstunden</a:t>
             </a:r>
           </a:p>
           <a:p>
-            <a:pPr lvl="1"/>
-            <a:r>
-              <a:rPr lang="de-CH" sz="1800" dirty="0"/>
-              <a:t>Überstunden</a:t>
-            </a:r>
-          </a:p>
-          <a:p>
-            <a:pPr lvl="1"/>
-            <a:r>
-              <a:rPr lang="de-CH" sz="1800" dirty="0"/>
-              <a:t>Minusstunden</a:t>
-            </a:r>
-          </a:p>
-          <a:p>
-            <a:pPr lvl="1"/>
-            <a:r>
-              <a:rPr lang="de-CH" sz="1800" dirty="0"/>
+            <a:pPr lvl="2"/>
+            <a:r>
+              <a:rPr lang="de-CH" dirty="0"/>
+              <a:t>Soll-stunden</a:t>
+            </a:r>
+          </a:p>
+          <a:p>
+            <a:pPr lvl="2"/>
+            <a:r>
+              <a:rPr lang="de-CH" dirty="0"/>
+              <a:t>Differenz-zeit</a:t>
+            </a:r>
+          </a:p>
+          <a:p>
+            <a:pPr lvl="2"/>
+            <a:r>
+              <a:rPr lang="de-CH" dirty="0"/>
+              <a:t>Pausen-Stunden</a:t>
+            </a:r>
+          </a:p>
+          <a:p>
+            <a:pPr lvl="2"/>
+            <a:r>
+              <a:rPr lang="de-CH" dirty="0"/>
               <a:t>Vertragsbedingungen eingehalten?</a:t>
             </a:r>
           </a:p>
           <a:p>
-            <a:pPr lvl="1"/>
-            <a:r>
-              <a:rPr lang="de-CH" sz="1800" dirty="0"/>
-              <a:t>Vertragsbedingungsverletzung?</a:t>
+            <a:pPr lvl="2"/>
+            <a:r>
+              <a:rPr lang="de-CH" dirty="0"/>
+              <a:t>Begründung der Vertrags-Verletzung</a:t>
             </a:r>
           </a:p>
           <a:p>

</xml_diff>